<commit_message>
Modified slides (updates to results)
git-svn-id: svn://svn.code.sf.net/p/kaldi/code/trunk@60 5e6a8d80-dfce-4ca6-a32a-6e07a63d50c8
</commit_message>
<xml_diff>
--- a/src/doc/Kaldi.pptx
+++ b/src/doc/Kaldi.pptx
@@ -222,7 +222,7 @@
           <a:p>
             <a:fld id="{85263039-BB7B-487F-8CFC-B54663039035}" type="datetimeFigureOut">
               <a:rPr lang="en-US" smtClean="0"/>
-              <a:t>5/26/2011</a:t>
+              <a:t>5/31/2011</a:t>
             </a:fld>
             <a:endParaRPr lang="en-US"/>
           </a:p>
@@ -387,7 +387,7 @@
           <a:p>
             <a:fld id="{2BB345F5-097F-4972-A927-323C6F358ABB}" type="datetimeFigureOut">
               <a:rPr lang="en-US" smtClean="0"/>
-              <a:t>5/26/2011</a:t>
+              <a:t>5/31/2011</a:t>
             </a:fld>
             <a:endParaRPr lang="en-US"/>
           </a:p>
@@ -2610,7 +2610,7 @@
           <a:p>
             <a:fld id="{AB95B4B5-8550-4AAE-AC0B-C7645433A62B}" type="datetimeFigureOut">
               <a:rPr lang="en-US" smtClean="0"/>
-              <a:t>5/26/2011</a:t>
+              <a:t>5/31/2011</a:t>
             </a:fld>
             <a:endParaRPr lang="en-US"/>
           </a:p>
@@ -2790,7 +2790,7 @@
           <a:p>
             <a:fld id="{AB95B4B5-8550-4AAE-AC0B-C7645433A62B}" type="datetimeFigureOut">
               <a:rPr lang="en-US" smtClean="0"/>
-              <a:t>5/26/2011</a:t>
+              <a:t>5/31/2011</a:t>
             </a:fld>
             <a:endParaRPr lang="en-US"/>
           </a:p>
@@ -2960,7 +2960,7 @@
           <a:p>
             <a:fld id="{AB95B4B5-8550-4AAE-AC0B-C7645433A62B}" type="datetimeFigureOut">
               <a:rPr lang="en-US" smtClean="0"/>
-              <a:t>5/26/2011</a:t>
+              <a:t>5/31/2011</a:t>
             </a:fld>
             <a:endParaRPr lang="en-US"/>
           </a:p>
@@ -3206,7 +3206,7 @@
           <a:p>
             <a:fld id="{AB95B4B5-8550-4AAE-AC0B-C7645433A62B}" type="datetimeFigureOut">
               <a:rPr lang="en-US" smtClean="0"/>
-              <a:t>5/26/2011</a:t>
+              <a:t>5/31/2011</a:t>
             </a:fld>
             <a:endParaRPr lang="en-US"/>
           </a:p>
@@ -3494,7 +3494,7 @@
           <a:p>
             <a:fld id="{AB95B4B5-8550-4AAE-AC0B-C7645433A62B}" type="datetimeFigureOut">
               <a:rPr lang="en-US" smtClean="0"/>
-              <a:t>5/26/2011</a:t>
+              <a:t>5/31/2011</a:t>
             </a:fld>
             <a:endParaRPr lang="en-US"/>
           </a:p>
@@ -3916,7 +3916,7 @@
           <a:p>
             <a:fld id="{AB95B4B5-8550-4AAE-AC0B-C7645433A62B}" type="datetimeFigureOut">
               <a:rPr lang="en-US" smtClean="0"/>
-              <a:t>5/26/2011</a:t>
+              <a:t>5/31/2011</a:t>
             </a:fld>
             <a:endParaRPr lang="en-US"/>
           </a:p>
@@ -4034,7 +4034,7 @@
           <a:p>
             <a:fld id="{AB95B4B5-8550-4AAE-AC0B-C7645433A62B}" type="datetimeFigureOut">
               <a:rPr lang="en-US" smtClean="0"/>
-              <a:t>5/26/2011</a:t>
+              <a:t>5/31/2011</a:t>
             </a:fld>
             <a:endParaRPr lang="en-US"/>
           </a:p>
@@ -4129,7 +4129,7 @@
           <a:p>
             <a:fld id="{AB95B4B5-8550-4AAE-AC0B-C7645433A62B}" type="datetimeFigureOut">
               <a:rPr lang="en-US" smtClean="0"/>
-              <a:t>5/26/2011</a:t>
+              <a:t>5/31/2011</a:t>
             </a:fld>
             <a:endParaRPr lang="en-US"/>
           </a:p>
@@ -4406,7 +4406,7 @@
           <a:p>
             <a:fld id="{AB95B4B5-8550-4AAE-AC0B-C7645433A62B}" type="datetimeFigureOut">
               <a:rPr lang="en-US" smtClean="0"/>
-              <a:t>5/26/2011</a:t>
+              <a:t>5/31/2011</a:t>
             </a:fld>
             <a:endParaRPr lang="en-US"/>
           </a:p>
@@ -4659,7 +4659,7 @@
           <a:p>
             <a:fld id="{AB95B4B5-8550-4AAE-AC0B-C7645433A62B}" type="datetimeFigureOut">
               <a:rPr lang="en-US" smtClean="0"/>
-              <a:t>5/26/2011</a:t>
+              <a:t>5/31/2011</a:t>
             </a:fld>
             <a:endParaRPr lang="en-US"/>
           </a:p>
@@ -5572,7 +5572,18 @@
                   </a:schemeClr>
                 </a:solidFill>
               </a:rPr>
-              <a:t>According </a:t>
+              <a:t>According to legend, </a:t>
+            </a:r>
+            <a:r>
+              <a:rPr lang="en-US" sz="2400" dirty="0" err="1" smtClean="0">
+                <a:solidFill>
+                  <a:schemeClr val="tx1">
+                    <a:lumMod val="75000"/>
+                    <a:lumOff val="25000"/>
+                  </a:schemeClr>
+                </a:solidFill>
+              </a:rPr>
+              <a:t>Kaldi</a:t>
             </a:r>
             <a:r>
               <a:rPr lang="en-US" sz="2400" dirty="0" smtClean="0">
@@ -5583,40 +5594,7 @@
                   </a:schemeClr>
                 </a:solidFill>
               </a:rPr>
-              <a:t>to legend, </a:t>
-            </a:r>
-            <a:r>
-              <a:rPr lang="en-US" sz="2400" dirty="0" err="1" smtClean="0">
-                <a:solidFill>
-                  <a:schemeClr val="tx1">
-                    <a:lumMod val="75000"/>
-                    <a:lumOff val="25000"/>
-                  </a:schemeClr>
-                </a:solidFill>
-              </a:rPr>
-              <a:t>Kaldi</a:t>
-            </a:r>
-            <a:r>
-              <a:rPr lang="en-US" sz="2400" dirty="0" smtClean="0">
-                <a:solidFill>
-                  <a:schemeClr val="tx1">
-                    <a:lumMod val="75000"/>
-                    <a:lumOff val="25000"/>
-                  </a:schemeClr>
-                </a:solidFill>
-              </a:rPr>
-              <a:t> was the Ethiopian goatherd who discovered the coffee </a:t>
-            </a:r>
-            <a:r>
-              <a:rPr lang="en-US" sz="2400" dirty="0" smtClean="0">
-                <a:solidFill>
-                  <a:schemeClr val="tx1">
-                    <a:lumMod val="75000"/>
-                    <a:lumOff val="25000"/>
-                  </a:schemeClr>
-                </a:solidFill>
-              </a:rPr>
-              <a:t>plant).</a:t>
+              <a:t> was the Ethiopian goatherd who discovered the coffee plant).</a:t>
             </a:r>
             <a:endParaRPr lang="en-US" sz="2400" dirty="0">
               <a:solidFill>
@@ -12976,7 +12954,7 @@
           <p:nvPr>
             <p:extLst>
               <p:ext uri="{D42A27DB-BD31-4B8C-83A1-F6EECF244321}">
-                <p14:modId xmlns:p14="http://schemas.microsoft.com/office/powerpoint/2010/main" val="3238714793"/>
+                <p14:modId xmlns:p14="http://schemas.microsoft.com/office/powerpoint/2010/main" val="1780749715"/>
               </p:ext>
             </p:extLst>
           </p:nvPr>
@@ -13459,6 +13437,10 @@
                     <a:lstStyle/>
                     <a:p>
                       <a:pPr algn="ctr"/>
+                      <a:r>
+                        <a:rPr lang="en-US" sz="2500" dirty="0" smtClean="0"/>
+                        <a:t>2.72</a:t>
+                      </a:r>
                       <a:endParaRPr lang="en-US" sz="2500" dirty="0"/>
                     </a:p>
                   </a:txBody>
@@ -13524,6 +13506,10 @@
                     <a:lstStyle/>
                     <a:p>
                       <a:pPr algn="ctr"/>
+                      <a:r>
+                        <a:rPr lang="en-US" sz="2500" dirty="0" smtClean="0"/>
+                        <a:t>2.53</a:t>
+                      </a:r>
                       <a:endParaRPr lang="en-US" sz="2500" dirty="0"/>
                     </a:p>
                   </a:txBody>

</xml_diff>